<commit_message>
Update to 5505 video05
</commit_message>
<xml_diff>
--- a/introduction-to-r/results/v03-slides-and-speaker-notes.pptx
+++ b/introduction-to-r/results/v03-slides-and-speaker-notes.pptx
@@ -73,7 +73,7 @@
     <p:sldId id="318" r:id="rId64"/>
     <p:sldId id="319" r:id="rId65"/>
   </p:sldIdLst>
-  <p:sldSz cx="9144000" cy="6858000" type="screen4x3"/>
+  <p:sldSz cx="12192000" cy="6858000"/>
   <p:notesSz cx="6858000" cy="9144000"/>
   <p:defaultTextStyle>
     <a:defPPr>
@@ -173,12 +173,12 @@
   <p:extLst>
     <p:ext uri="{EFAFB233-063F-42B5-8137-9DF3F51BA10A}">
       <p15:sldGuideLst xmlns:p15="http://schemas.microsoft.com/office/powerpoint/2012/main">
-        <p15:guide id="1" orient="horz" pos="2160">
+        <p15:guide id="1" orient="horz" pos="2160" userDrawn="1">
           <p15:clr>
             <a:srgbClr val="A4A3A4"/>
           </p15:clr>
         </p15:guide>
-        <p15:guide id="2" pos="2880">
+        <p15:guide id="2" pos="3840" userDrawn="1">
           <p15:clr>
             <a:srgbClr val="A4A3A4"/>
           </p15:clr>
@@ -271,7 +271,7 @@
           <a:p>
             <a:fld id="{0F9C1CCF-B725-44A7-AA57-5E433BD85C9F}" type="datetimeFigureOut">
               <a:rPr lang="en-US" smtClean="0"/>
-              <a:t>4/5/2019</a:t>
+              <a:t>3/7/2022</a:t>
             </a:fld>
             <a:endParaRPr lang="en-US"/>
           </a:p>
@@ -289,8 +289,8 @@
         </p:nvSpPr>
         <p:spPr>
           <a:xfrm>
-            <a:off x="1371600" y="1143000"/>
-            <a:ext cx="4114800" cy="3086100"/>
+            <a:off x="685800" y="1143000"/>
+            <a:ext cx="5486400" cy="3086100"/>
           </a:xfrm>
           <a:prstGeom prst="rect">
             <a:avLst/>
@@ -335,38 +335,37 @@
           <a:p>
             <a:pPr lvl="0"/>
             <a:r>
-              <a:rPr lang="en-US" smtClean="0"/>
+              <a:rPr lang="en-US"/>
               <a:t>Click to edit Master text styles</a:t>
             </a:r>
           </a:p>
           <a:p>
             <a:pPr lvl="1"/>
             <a:r>
-              <a:rPr lang="en-US" smtClean="0"/>
+              <a:rPr lang="en-US"/>
               <a:t>Second level</a:t>
             </a:r>
           </a:p>
           <a:p>
             <a:pPr lvl="2"/>
             <a:r>
-              <a:rPr lang="en-US" smtClean="0"/>
+              <a:rPr lang="en-US"/>
               <a:t>Third level</a:t>
             </a:r>
           </a:p>
           <a:p>
             <a:pPr lvl="3"/>
             <a:r>
-              <a:rPr lang="en-US" smtClean="0"/>
+              <a:rPr lang="en-US"/>
               <a:t>Fourth level</a:t>
             </a:r>
           </a:p>
           <a:p>
             <a:pPr lvl="4"/>
             <a:r>
-              <a:rPr lang="en-US" smtClean="0"/>
+              <a:rPr lang="en-US"/>
               <a:t>Fifth level</a:t>
             </a:r>
-            <a:endParaRPr lang="en-US"/>
           </a:p>
         </p:txBody>
       </p:sp>
@@ -25388,8 +25387,8 @@
         </p:nvSpPr>
         <p:spPr>
           <a:xfrm>
-            <a:off x="685800" y="2130425"/>
-            <a:ext cx="7772400" cy="1470025"/>
+            <a:off x="914400" y="2130426"/>
+            <a:ext cx="10363200" cy="1470025"/>
           </a:xfrm>
         </p:spPr>
         <p:txBody>
@@ -25397,10 +25396,9 @@
           <a:lstStyle/>
           <a:p>
             <a:r>
-              <a:rPr lang="en-US" smtClean="0"/>
+              <a:rPr lang="en-US"/>
               <a:t>Click to edit Master title style</a:t>
             </a:r>
-            <a:endParaRPr lang="en-US"/>
           </a:p>
         </p:txBody>
       </p:sp>
@@ -25416,8 +25414,8 @@
         </p:nvSpPr>
         <p:spPr>
           <a:xfrm>
-            <a:off x="1371600" y="3886200"/>
-            <a:ext cx="6400800" cy="1752600"/>
+            <a:off x="1828800" y="3886200"/>
+            <a:ext cx="8534400" cy="1752600"/>
           </a:xfrm>
         </p:spPr>
         <p:txBody>
@@ -25516,10 +25514,9 @@
           </a:lstStyle>
           <a:p>
             <a:r>
-              <a:rPr lang="en-US" smtClean="0"/>
+              <a:rPr lang="en-US"/>
               <a:t>Click to edit Master subtitle style</a:t>
             </a:r>
-            <a:endParaRPr lang="en-US"/>
           </a:p>
         </p:txBody>
       </p:sp>
@@ -25540,7 +25537,7 @@
           <a:p>
             <a:fld id="{241EB5C9-1307-BA42-ABA2-0BC069CD8E7F}" type="datetimeFigureOut">
               <a:rPr lang="en-US" smtClean="0"/>
-              <a:t>4/5/2019</a:t>
+              <a:t>3/7/2022</a:t>
             </a:fld>
             <a:endParaRPr lang="en-US"/>
           </a:p>
@@ -25634,10 +25631,9 @@
           <a:lstStyle/>
           <a:p>
             <a:r>
-              <a:rPr lang="en-US" smtClean="0"/>
+              <a:rPr lang="en-US"/>
               <a:t>Click to edit Master title style</a:t>
             </a:r>
-            <a:endParaRPr lang="en-US"/>
           </a:p>
         </p:txBody>
       </p:sp>
@@ -25658,38 +25654,37 @@
           <a:p>
             <a:pPr lvl="0"/>
             <a:r>
-              <a:rPr lang="en-US" smtClean="0"/>
+              <a:rPr lang="en-US"/>
               <a:t>Click to edit Master text styles</a:t>
             </a:r>
           </a:p>
           <a:p>
             <a:pPr lvl="1"/>
             <a:r>
-              <a:rPr lang="en-US" smtClean="0"/>
+              <a:rPr lang="en-US"/>
               <a:t>Second level</a:t>
             </a:r>
           </a:p>
           <a:p>
             <a:pPr lvl="2"/>
             <a:r>
-              <a:rPr lang="en-US" smtClean="0"/>
+              <a:rPr lang="en-US"/>
               <a:t>Third level</a:t>
             </a:r>
           </a:p>
           <a:p>
             <a:pPr lvl="3"/>
             <a:r>
-              <a:rPr lang="en-US" smtClean="0"/>
+              <a:rPr lang="en-US"/>
               <a:t>Fourth level</a:t>
             </a:r>
           </a:p>
           <a:p>
             <a:pPr lvl="4"/>
             <a:r>
-              <a:rPr lang="en-US" smtClean="0"/>
+              <a:rPr lang="en-US"/>
               <a:t>Fifth level</a:t>
             </a:r>
-            <a:endParaRPr lang="en-US"/>
           </a:p>
         </p:txBody>
       </p:sp>
@@ -25710,7 +25705,7 @@
           <a:p>
             <a:fld id="{241EB5C9-1307-BA42-ABA2-0BC069CD8E7F}" type="datetimeFigureOut">
               <a:rPr lang="en-US" smtClean="0"/>
-              <a:t>4/5/2019</a:t>
+              <a:t>3/7/2022</a:t>
             </a:fld>
             <a:endParaRPr lang="en-US"/>
           </a:p>
@@ -25800,8 +25795,8 @@
         </p:nvSpPr>
         <p:spPr>
           <a:xfrm>
-            <a:off x="6629400" y="274638"/>
-            <a:ext cx="2057400" cy="5851525"/>
+            <a:off x="8839200" y="274639"/>
+            <a:ext cx="2743200" cy="5851525"/>
           </a:xfrm>
         </p:spPr>
         <p:txBody>
@@ -25809,10 +25804,9 @@
           <a:lstStyle/>
           <a:p>
             <a:r>
-              <a:rPr lang="en-US" smtClean="0"/>
+              <a:rPr lang="en-US"/>
               <a:t>Click to edit Master title style</a:t>
             </a:r>
-            <a:endParaRPr lang="en-US"/>
           </a:p>
         </p:txBody>
       </p:sp>
@@ -25828,8 +25822,8 @@
         </p:nvSpPr>
         <p:spPr>
           <a:xfrm>
-            <a:off x="457200" y="274638"/>
-            <a:ext cx="6019800" cy="5851525"/>
+            <a:off x="609600" y="274639"/>
+            <a:ext cx="8026400" cy="5851525"/>
           </a:xfrm>
         </p:spPr>
         <p:txBody>
@@ -25838,38 +25832,37 @@
           <a:p>
             <a:pPr lvl="0"/>
             <a:r>
-              <a:rPr lang="en-US" smtClean="0"/>
+              <a:rPr lang="en-US"/>
               <a:t>Click to edit Master text styles</a:t>
             </a:r>
           </a:p>
           <a:p>
             <a:pPr lvl="1"/>
             <a:r>
-              <a:rPr lang="en-US" smtClean="0"/>
+              <a:rPr lang="en-US"/>
               <a:t>Second level</a:t>
             </a:r>
           </a:p>
           <a:p>
             <a:pPr lvl="2"/>
             <a:r>
-              <a:rPr lang="en-US" smtClean="0"/>
+              <a:rPr lang="en-US"/>
               <a:t>Third level</a:t>
             </a:r>
           </a:p>
           <a:p>
             <a:pPr lvl="3"/>
             <a:r>
-              <a:rPr lang="en-US" smtClean="0"/>
+              <a:rPr lang="en-US"/>
               <a:t>Fourth level</a:t>
             </a:r>
           </a:p>
           <a:p>
             <a:pPr lvl="4"/>
             <a:r>
-              <a:rPr lang="en-US" smtClean="0"/>
+              <a:rPr lang="en-US"/>
               <a:t>Fifth level</a:t>
             </a:r>
-            <a:endParaRPr lang="en-US"/>
           </a:p>
         </p:txBody>
       </p:sp>
@@ -25890,7 +25883,7 @@
           <a:p>
             <a:fld id="{241EB5C9-1307-BA42-ABA2-0BC069CD8E7F}" type="datetimeFigureOut">
               <a:rPr lang="en-US" smtClean="0"/>
-              <a:t>4/5/2019</a:t>
+              <a:t>3/7/2022</a:t>
             </a:fld>
             <a:endParaRPr lang="en-US"/>
           </a:p>
@@ -25984,10 +25977,9 @@
           <a:lstStyle/>
           <a:p>
             <a:r>
-              <a:rPr lang="en-US" smtClean="0"/>
+              <a:rPr lang="en-US"/>
               <a:t>Click to edit Master title style</a:t>
             </a:r>
-            <a:endParaRPr lang="en-US"/>
           </a:p>
         </p:txBody>
       </p:sp>
@@ -26008,38 +26000,37 @@
           <a:p>
             <a:pPr lvl="0"/>
             <a:r>
-              <a:rPr lang="en-US" smtClean="0"/>
+              <a:rPr lang="en-US"/>
               <a:t>Click to edit Master text styles</a:t>
             </a:r>
           </a:p>
           <a:p>
             <a:pPr lvl="1"/>
             <a:r>
-              <a:rPr lang="en-US" smtClean="0"/>
+              <a:rPr lang="en-US"/>
               <a:t>Second level</a:t>
             </a:r>
           </a:p>
           <a:p>
             <a:pPr lvl="2"/>
             <a:r>
-              <a:rPr lang="en-US" smtClean="0"/>
+              <a:rPr lang="en-US"/>
               <a:t>Third level</a:t>
             </a:r>
           </a:p>
           <a:p>
             <a:pPr lvl="3"/>
             <a:r>
-              <a:rPr lang="en-US" smtClean="0"/>
+              <a:rPr lang="en-US"/>
               <a:t>Fourth level</a:t>
             </a:r>
           </a:p>
           <a:p>
             <a:pPr lvl="4"/>
             <a:r>
-              <a:rPr lang="en-US" smtClean="0"/>
+              <a:rPr lang="en-US"/>
               <a:t>Fifth level</a:t>
             </a:r>
-            <a:endParaRPr lang="en-US"/>
           </a:p>
         </p:txBody>
       </p:sp>
@@ -26060,7 +26051,7 @@
           <a:p>
             <a:fld id="{241EB5C9-1307-BA42-ABA2-0BC069CD8E7F}" type="datetimeFigureOut">
               <a:rPr lang="en-US" smtClean="0"/>
-              <a:t>4/5/2019</a:t>
+              <a:t>3/7/2022</a:t>
             </a:fld>
             <a:endParaRPr lang="en-US"/>
           </a:p>
@@ -26150,8 +26141,8 @@
         </p:nvSpPr>
         <p:spPr>
           <a:xfrm>
-            <a:off x="722313" y="4406900"/>
-            <a:ext cx="7772400" cy="1362075"/>
+            <a:off x="963084" y="4406901"/>
+            <a:ext cx="10363200" cy="1362075"/>
           </a:xfrm>
         </p:spPr>
         <p:txBody>
@@ -26163,10 +26154,9 @@
           </a:lstStyle>
           <a:p>
             <a:r>
-              <a:rPr lang="en-US" smtClean="0"/>
+              <a:rPr lang="en-US"/>
               <a:t>Click to edit Master title style</a:t>
             </a:r>
-            <a:endParaRPr lang="en-US"/>
           </a:p>
         </p:txBody>
       </p:sp>
@@ -26182,8 +26172,8 @@
         </p:nvSpPr>
         <p:spPr>
           <a:xfrm>
-            <a:off x="722313" y="2906713"/>
-            <a:ext cx="7772400" cy="1500187"/>
+            <a:off x="963084" y="2906713"/>
+            <a:ext cx="10363200" cy="1500187"/>
           </a:xfrm>
         </p:spPr>
         <p:txBody>
@@ -26283,7 +26273,7 @@
           <a:p>
             <a:pPr lvl="0"/>
             <a:r>
-              <a:rPr lang="en-US" smtClean="0"/>
+              <a:rPr lang="en-US"/>
               <a:t>Click to edit Master text styles</a:t>
             </a:r>
           </a:p>
@@ -26306,7 +26296,7 @@
           <a:p>
             <a:fld id="{241EB5C9-1307-BA42-ABA2-0BC069CD8E7F}" type="datetimeFigureOut">
               <a:rPr lang="en-US" smtClean="0"/>
-              <a:t>4/5/2019</a:t>
+              <a:t>3/7/2022</a:t>
             </a:fld>
             <a:endParaRPr lang="en-US"/>
           </a:p>
@@ -26400,10 +26390,9 @@
           <a:lstStyle/>
           <a:p>
             <a:r>
-              <a:rPr lang="en-US" smtClean="0"/>
+              <a:rPr lang="en-US"/>
               <a:t>Click to edit Master title style</a:t>
             </a:r>
-            <a:endParaRPr lang="en-US"/>
           </a:p>
         </p:txBody>
       </p:sp>
@@ -26419,8 +26408,8 @@
         </p:nvSpPr>
         <p:spPr>
           <a:xfrm>
-            <a:off x="457200" y="1600200"/>
-            <a:ext cx="4038600" cy="4525963"/>
+            <a:off x="609600" y="1600201"/>
+            <a:ext cx="5384800" cy="4525963"/>
           </a:xfrm>
         </p:spPr>
         <p:txBody>
@@ -26457,38 +26446,37 @@
           <a:p>
             <a:pPr lvl="0"/>
             <a:r>
-              <a:rPr lang="en-US" smtClean="0"/>
+              <a:rPr lang="en-US"/>
               <a:t>Click to edit Master text styles</a:t>
             </a:r>
           </a:p>
           <a:p>
             <a:pPr lvl="1"/>
             <a:r>
-              <a:rPr lang="en-US" smtClean="0"/>
+              <a:rPr lang="en-US"/>
               <a:t>Second level</a:t>
             </a:r>
           </a:p>
           <a:p>
             <a:pPr lvl="2"/>
             <a:r>
-              <a:rPr lang="en-US" smtClean="0"/>
+              <a:rPr lang="en-US"/>
               <a:t>Third level</a:t>
             </a:r>
           </a:p>
           <a:p>
             <a:pPr lvl="3"/>
             <a:r>
-              <a:rPr lang="en-US" smtClean="0"/>
+              <a:rPr lang="en-US"/>
               <a:t>Fourth level</a:t>
             </a:r>
           </a:p>
           <a:p>
             <a:pPr lvl="4"/>
             <a:r>
-              <a:rPr lang="en-US" smtClean="0"/>
+              <a:rPr lang="en-US"/>
               <a:t>Fifth level</a:t>
             </a:r>
-            <a:endParaRPr lang="en-US"/>
           </a:p>
         </p:txBody>
       </p:sp>
@@ -26504,8 +26492,8 @@
         </p:nvSpPr>
         <p:spPr>
           <a:xfrm>
-            <a:off x="4648200" y="1600200"/>
-            <a:ext cx="4038600" cy="4525963"/>
+            <a:off x="6197600" y="1600201"/>
+            <a:ext cx="5384800" cy="4525963"/>
           </a:xfrm>
         </p:spPr>
         <p:txBody>
@@ -26542,38 +26530,37 @@
           <a:p>
             <a:pPr lvl="0"/>
             <a:r>
-              <a:rPr lang="en-US" smtClean="0"/>
+              <a:rPr lang="en-US"/>
               <a:t>Click to edit Master text styles</a:t>
             </a:r>
           </a:p>
           <a:p>
             <a:pPr lvl="1"/>
             <a:r>
-              <a:rPr lang="en-US" smtClean="0"/>
+              <a:rPr lang="en-US"/>
               <a:t>Second level</a:t>
             </a:r>
           </a:p>
           <a:p>
             <a:pPr lvl="2"/>
             <a:r>
-              <a:rPr lang="en-US" smtClean="0"/>
+              <a:rPr lang="en-US"/>
               <a:t>Third level</a:t>
             </a:r>
           </a:p>
           <a:p>
             <a:pPr lvl="3"/>
             <a:r>
-              <a:rPr lang="en-US" smtClean="0"/>
+              <a:rPr lang="en-US"/>
               <a:t>Fourth level</a:t>
             </a:r>
           </a:p>
           <a:p>
             <a:pPr lvl="4"/>
             <a:r>
-              <a:rPr lang="en-US" smtClean="0"/>
+              <a:rPr lang="en-US"/>
               <a:t>Fifth level</a:t>
             </a:r>
-            <a:endParaRPr lang="en-US"/>
           </a:p>
         </p:txBody>
       </p:sp>
@@ -26594,7 +26581,7 @@
           <a:p>
             <a:fld id="{241EB5C9-1307-BA42-ABA2-0BC069CD8E7F}" type="datetimeFigureOut">
               <a:rPr lang="en-US" smtClean="0"/>
-              <a:t>4/5/2019</a:t>
+              <a:t>3/7/2022</a:t>
             </a:fld>
             <a:endParaRPr lang="en-US"/>
           </a:p>
@@ -26692,10 +26679,9 @@
           </a:lstStyle>
           <a:p>
             <a:r>
-              <a:rPr lang="en-US" smtClean="0"/>
+              <a:rPr lang="en-US"/>
               <a:t>Click to edit Master title style</a:t>
             </a:r>
-            <a:endParaRPr lang="en-US"/>
           </a:p>
         </p:txBody>
       </p:sp>
@@ -26711,8 +26697,8 @@
         </p:nvSpPr>
         <p:spPr>
           <a:xfrm>
-            <a:off x="457200" y="1535113"/>
-            <a:ext cx="4040188" cy="639762"/>
+            <a:off x="609600" y="1535113"/>
+            <a:ext cx="5386917" cy="639762"/>
           </a:xfrm>
         </p:spPr>
         <p:txBody>
@@ -26758,7 +26744,7 @@
           <a:p>
             <a:pPr lvl="0"/>
             <a:r>
-              <a:rPr lang="en-US" smtClean="0"/>
+              <a:rPr lang="en-US"/>
               <a:t>Click to edit Master text styles</a:t>
             </a:r>
           </a:p>
@@ -26776,8 +26762,8 @@
         </p:nvSpPr>
         <p:spPr>
           <a:xfrm>
-            <a:off x="457200" y="2174875"/>
-            <a:ext cx="4040188" cy="3951288"/>
+            <a:off x="609600" y="2174875"/>
+            <a:ext cx="5386917" cy="3951288"/>
           </a:xfrm>
         </p:spPr>
         <p:txBody>
@@ -26814,38 +26800,37 @@
           <a:p>
             <a:pPr lvl="0"/>
             <a:r>
-              <a:rPr lang="en-US" smtClean="0"/>
+              <a:rPr lang="en-US"/>
               <a:t>Click to edit Master text styles</a:t>
             </a:r>
           </a:p>
           <a:p>
             <a:pPr lvl="1"/>
             <a:r>
-              <a:rPr lang="en-US" smtClean="0"/>
+              <a:rPr lang="en-US"/>
               <a:t>Second level</a:t>
             </a:r>
           </a:p>
           <a:p>
             <a:pPr lvl="2"/>
             <a:r>
-              <a:rPr lang="en-US" smtClean="0"/>
+              <a:rPr lang="en-US"/>
               <a:t>Third level</a:t>
             </a:r>
           </a:p>
           <a:p>
             <a:pPr lvl="3"/>
             <a:r>
-              <a:rPr lang="en-US" smtClean="0"/>
+              <a:rPr lang="en-US"/>
               <a:t>Fourth level</a:t>
             </a:r>
           </a:p>
           <a:p>
             <a:pPr lvl="4"/>
             <a:r>
-              <a:rPr lang="en-US" smtClean="0"/>
+              <a:rPr lang="en-US"/>
               <a:t>Fifth level</a:t>
             </a:r>
-            <a:endParaRPr lang="en-US"/>
           </a:p>
         </p:txBody>
       </p:sp>
@@ -26861,8 +26846,8 @@
         </p:nvSpPr>
         <p:spPr>
           <a:xfrm>
-            <a:off x="4645025" y="1535113"/>
-            <a:ext cx="4041775" cy="639762"/>
+            <a:off x="6193368" y="1535113"/>
+            <a:ext cx="5389033" cy="639762"/>
           </a:xfrm>
         </p:spPr>
         <p:txBody>
@@ -26908,7 +26893,7 @@
           <a:p>
             <a:pPr lvl="0"/>
             <a:r>
-              <a:rPr lang="en-US" smtClean="0"/>
+              <a:rPr lang="en-US"/>
               <a:t>Click to edit Master text styles</a:t>
             </a:r>
           </a:p>
@@ -26926,8 +26911,8 @@
         </p:nvSpPr>
         <p:spPr>
           <a:xfrm>
-            <a:off x="4645025" y="2174875"/>
-            <a:ext cx="4041775" cy="3951288"/>
+            <a:off x="6193368" y="2174875"/>
+            <a:ext cx="5389033" cy="3951288"/>
           </a:xfrm>
         </p:spPr>
         <p:txBody>
@@ -26964,38 +26949,37 @@
           <a:p>
             <a:pPr lvl="0"/>
             <a:r>
-              <a:rPr lang="en-US" smtClean="0"/>
+              <a:rPr lang="en-US"/>
               <a:t>Click to edit Master text styles</a:t>
             </a:r>
           </a:p>
           <a:p>
             <a:pPr lvl="1"/>
             <a:r>
-              <a:rPr lang="en-US" smtClean="0"/>
+              <a:rPr lang="en-US"/>
               <a:t>Second level</a:t>
             </a:r>
           </a:p>
           <a:p>
             <a:pPr lvl="2"/>
             <a:r>
-              <a:rPr lang="en-US" smtClean="0"/>
+              <a:rPr lang="en-US"/>
               <a:t>Third level</a:t>
             </a:r>
           </a:p>
           <a:p>
             <a:pPr lvl="3"/>
             <a:r>
-              <a:rPr lang="en-US" smtClean="0"/>
+              <a:rPr lang="en-US"/>
               <a:t>Fourth level</a:t>
             </a:r>
           </a:p>
           <a:p>
             <a:pPr lvl="4"/>
             <a:r>
-              <a:rPr lang="en-US" smtClean="0"/>
+              <a:rPr lang="en-US"/>
               <a:t>Fifth level</a:t>
             </a:r>
-            <a:endParaRPr lang="en-US"/>
           </a:p>
         </p:txBody>
       </p:sp>
@@ -27016,7 +27000,7 @@
           <a:p>
             <a:fld id="{241EB5C9-1307-BA42-ABA2-0BC069CD8E7F}" type="datetimeFigureOut">
               <a:rPr lang="en-US" smtClean="0"/>
-              <a:t>4/5/2019</a:t>
+              <a:t>3/7/2022</a:t>
             </a:fld>
             <a:endParaRPr lang="en-US"/>
           </a:p>
@@ -27110,10 +27094,9 @@
           <a:lstStyle/>
           <a:p>
             <a:r>
-              <a:rPr lang="en-US" smtClean="0"/>
+              <a:rPr lang="en-US"/>
               <a:t>Click to edit Master title style</a:t>
             </a:r>
-            <a:endParaRPr lang="en-US"/>
           </a:p>
         </p:txBody>
       </p:sp>
@@ -27134,7 +27117,7 @@
           <a:p>
             <a:fld id="{241EB5C9-1307-BA42-ABA2-0BC069CD8E7F}" type="datetimeFigureOut">
               <a:rPr lang="en-US" smtClean="0"/>
-              <a:t>4/5/2019</a:t>
+              <a:t>3/7/2022</a:t>
             </a:fld>
             <a:endParaRPr lang="en-US"/>
           </a:p>
@@ -27229,7 +27212,7 @@
           <a:p>
             <a:fld id="{241EB5C9-1307-BA42-ABA2-0BC069CD8E7F}" type="datetimeFigureOut">
               <a:rPr lang="en-US" smtClean="0"/>
-              <a:t>4/5/2019</a:t>
+              <a:t>3/7/2022</a:t>
             </a:fld>
             <a:endParaRPr lang="en-US"/>
           </a:p>
@@ -27319,8 +27302,8 @@
         </p:nvSpPr>
         <p:spPr>
           <a:xfrm>
-            <a:off x="457200" y="273050"/>
-            <a:ext cx="3008313" cy="1162050"/>
+            <a:off x="609601" y="273050"/>
+            <a:ext cx="4011084" cy="1162050"/>
           </a:xfrm>
         </p:spPr>
         <p:txBody>
@@ -27332,10 +27315,9 @@
           </a:lstStyle>
           <a:p>
             <a:r>
-              <a:rPr lang="en-US" smtClean="0"/>
+              <a:rPr lang="en-US"/>
               <a:t>Click to edit Master title style</a:t>
             </a:r>
-            <a:endParaRPr lang="en-US"/>
           </a:p>
         </p:txBody>
       </p:sp>
@@ -27351,8 +27333,8 @@
         </p:nvSpPr>
         <p:spPr>
           <a:xfrm>
-            <a:off x="3575050" y="273050"/>
-            <a:ext cx="5111750" cy="5853113"/>
+            <a:off x="4766733" y="273051"/>
+            <a:ext cx="6815667" cy="5853113"/>
           </a:xfrm>
         </p:spPr>
         <p:txBody>
@@ -27389,38 +27371,37 @@
           <a:p>
             <a:pPr lvl="0"/>
             <a:r>
-              <a:rPr lang="en-US" smtClean="0"/>
+              <a:rPr lang="en-US"/>
               <a:t>Click to edit Master text styles</a:t>
             </a:r>
           </a:p>
           <a:p>
             <a:pPr lvl="1"/>
             <a:r>
-              <a:rPr lang="en-US" smtClean="0"/>
+              <a:rPr lang="en-US"/>
               <a:t>Second level</a:t>
             </a:r>
           </a:p>
           <a:p>
             <a:pPr lvl="2"/>
             <a:r>
-              <a:rPr lang="en-US" smtClean="0"/>
+              <a:rPr lang="en-US"/>
               <a:t>Third level</a:t>
             </a:r>
           </a:p>
           <a:p>
             <a:pPr lvl="3"/>
             <a:r>
-              <a:rPr lang="en-US" smtClean="0"/>
+              <a:rPr lang="en-US"/>
               <a:t>Fourth level</a:t>
             </a:r>
           </a:p>
           <a:p>
             <a:pPr lvl="4"/>
             <a:r>
-              <a:rPr lang="en-US" smtClean="0"/>
+              <a:rPr lang="en-US"/>
               <a:t>Fifth level</a:t>
             </a:r>
-            <a:endParaRPr lang="en-US"/>
           </a:p>
         </p:txBody>
       </p:sp>
@@ -27436,8 +27417,8 @@
         </p:nvSpPr>
         <p:spPr>
           <a:xfrm>
-            <a:off x="457200" y="1435100"/>
-            <a:ext cx="3008313" cy="4691063"/>
+            <a:off x="609601" y="1435101"/>
+            <a:ext cx="4011084" cy="4691063"/>
           </a:xfrm>
         </p:spPr>
         <p:txBody>
@@ -27483,7 +27464,7 @@
           <a:p>
             <a:pPr lvl="0"/>
             <a:r>
-              <a:rPr lang="en-US" smtClean="0"/>
+              <a:rPr lang="en-US"/>
               <a:t>Click to edit Master text styles</a:t>
             </a:r>
           </a:p>
@@ -27506,7 +27487,7 @@
           <a:p>
             <a:fld id="{241EB5C9-1307-BA42-ABA2-0BC069CD8E7F}" type="datetimeFigureOut">
               <a:rPr lang="en-US" smtClean="0"/>
-              <a:t>4/5/2019</a:t>
+              <a:t>3/7/2022</a:t>
             </a:fld>
             <a:endParaRPr lang="en-US"/>
           </a:p>
@@ -27596,8 +27577,8 @@
         </p:nvSpPr>
         <p:spPr>
           <a:xfrm>
-            <a:off x="1792288" y="4800600"/>
-            <a:ext cx="5486400" cy="566738"/>
+            <a:off x="2389717" y="4800600"/>
+            <a:ext cx="7315200" cy="566738"/>
           </a:xfrm>
         </p:spPr>
         <p:txBody>
@@ -27609,10 +27590,9 @@
           </a:lstStyle>
           <a:p>
             <a:r>
-              <a:rPr lang="en-US" smtClean="0"/>
+              <a:rPr lang="en-US"/>
               <a:t>Click to edit Master title style</a:t>
             </a:r>
-            <a:endParaRPr lang="en-US"/>
           </a:p>
         </p:txBody>
       </p:sp>
@@ -27628,8 +27608,8 @@
         </p:nvSpPr>
         <p:spPr>
           <a:xfrm>
-            <a:off x="1792288" y="612775"/>
-            <a:ext cx="5486400" cy="4114800"/>
+            <a:off x="2389717" y="612775"/>
+            <a:ext cx="7315200" cy="4114800"/>
           </a:xfrm>
         </p:spPr>
         <p:txBody>
@@ -27689,8 +27669,8 @@
         </p:nvSpPr>
         <p:spPr>
           <a:xfrm>
-            <a:off x="1792288" y="5367338"/>
-            <a:ext cx="5486400" cy="804862"/>
+            <a:off x="2389717" y="5367338"/>
+            <a:ext cx="7315200" cy="804862"/>
           </a:xfrm>
         </p:spPr>
         <p:txBody>
@@ -27736,7 +27716,7 @@
           <a:p>
             <a:pPr lvl="0"/>
             <a:r>
-              <a:rPr lang="en-US" smtClean="0"/>
+              <a:rPr lang="en-US"/>
               <a:t>Click to edit Master text styles</a:t>
             </a:r>
           </a:p>
@@ -27759,7 +27739,7 @@
           <a:p>
             <a:fld id="{241EB5C9-1307-BA42-ABA2-0BC069CD8E7F}" type="datetimeFigureOut">
               <a:rPr lang="en-US" smtClean="0"/>
-              <a:t>4/5/2019</a:t>
+              <a:t>3/7/2022</a:t>
             </a:fld>
             <a:endParaRPr lang="en-US"/>
           </a:p>
@@ -27854,8 +27834,8 @@
         </p:nvSpPr>
         <p:spPr>
           <a:xfrm>
-            <a:off x="457200" y="274638"/>
-            <a:ext cx="8229600" cy="1143000"/>
+            <a:off x="609600" y="274638"/>
+            <a:ext cx="10972800" cy="1143000"/>
           </a:xfrm>
           <a:prstGeom prst="rect">
             <a:avLst/>
@@ -27868,10 +27848,9 @@
           <a:lstStyle/>
           <a:p>
             <a:r>
-              <a:rPr lang="en-US" smtClean="0"/>
+              <a:rPr lang="en-US"/>
               <a:t>Click to edit Master title style</a:t>
             </a:r>
-            <a:endParaRPr lang="en-US"/>
           </a:p>
         </p:txBody>
       </p:sp>
@@ -27887,8 +27866,8 @@
         </p:nvSpPr>
         <p:spPr>
           <a:xfrm>
-            <a:off x="457200" y="1600200"/>
-            <a:ext cx="8229600" cy="4525963"/>
+            <a:off x="609600" y="1600201"/>
+            <a:ext cx="10972800" cy="4525963"/>
           </a:xfrm>
           <a:prstGeom prst="rect">
             <a:avLst/>
@@ -27902,38 +27881,37 @@
           <a:p>
             <a:pPr lvl="0"/>
             <a:r>
-              <a:rPr lang="en-US" smtClean="0"/>
+              <a:rPr lang="en-US"/>
               <a:t>Click to edit Master text styles</a:t>
             </a:r>
           </a:p>
           <a:p>
             <a:pPr lvl="1"/>
             <a:r>
-              <a:rPr lang="en-US" smtClean="0"/>
+              <a:rPr lang="en-US"/>
               <a:t>Second level</a:t>
             </a:r>
           </a:p>
           <a:p>
             <a:pPr lvl="2"/>
             <a:r>
-              <a:rPr lang="en-US" smtClean="0"/>
+              <a:rPr lang="en-US"/>
               <a:t>Third level</a:t>
             </a:r>
           </a:p>
           <a:p>
             <a:pPr lvl="3"/>
             <a:r>
-              <a:rPr lang="en-US" smtClean="0"/>
+              <a:rPr lang="en-US"/>
               <a:t>Fourth level</a:t>
             </a:r>
           </a:p>
           <a:p>
             <a:pPr lvl="4"/>
             <a:r>
-              <a:rPr lang="en-US" smtClean="0"/>
+              <a:rPr lang="en-US"/>
               <a:t>Fifth level</a:t>
             </a:r>
-            <a:endParaRPr lang="en-US"/>
           </a:p>
         </p:txBody>
       </p:sp>
@@ -27949,8 +27927,8 @@
         </p:nvSpPr>
         <p:spPr>
           <a:xfrm>
-            <a:off x="457200" y="6356350"/>
-            <a:ext cx="2133600" cy="365125"/>
+            <a:off x="609600" y="6356351"/>
+            <a:ext cx="2844800" cy="365125"/>
           </a:xfrm>
           <a:prstGeom prst="rect">
             <a:avLst/>
@@ -27972,7 +27950,7 @@
           <a:p>
             <a:fld id="{241EB5C9-1307-BA42-ABA2-0BC069CD8E7F}" type="datetimeFigureOut">
               <a:rPr lang="en-US" smtClean="0"/>
-              <a:t>4/5/2019</a:t>
+              <a:t>3/7/2022</a:t>
             </a:fld>
             <a:endParaRPr lang="en-US"/>
           </a:p>
@@ -27990,8 +27968,8 @@
         </p:nvSpPr>
         <p:spPr>
           <a:xfrm>
-            <a:off x="3124200" y="6356350"/>
-            <a:ext cx="2895600" cy="365125"/>
+            <a:off x="4165600" y="6356351"/>
+            <a:ext cx="3860800" cy="365125"/>
           </a:xfrm>
           <a:prstGeom prst="rect">
             <a:avLst/>
@@ -28027,8 +28005,8 @@
         </p:nvSpPr>
         <p:spPr>
           <a:xfrm>
-            <a:off x="6553200" y="6356350"/>
-            <a:ext cx="2133600" cy="365125"/>
+            <a:off x="8737600" y="6356351"/>
+            <a:ext cx="2844800" cy="365125"/>
           </a:xfrm>
           <a:prstGeom prst="rect">
             <a:avLst/>
@@ -28359,8 +28337,8 @@
         </p:nvSpPr>
         <p:spPr>
           <a:xfrm>
-            <a:off x="685800" y="2130425"/>
-            <a:ext cx="7772400" cy="1470025"/>
+            <a:off x="914400" y="2130426"/>
+            <a:ext cx="10363200" cy="1470025"/>
           </a:xfrm>
         </p:spPr>
         <p:txBody>
@@ -28413,8 +28391,8 @@
         </p:nvSpPr>
         <p:spPr>
           <a:xfrm>
-            <a:off x="1371600" y="3886200"/>
-            <a:ext cx="6400800" cy="1752600"/>
+            <a:off x="1828800" y="3886200"/>
+            <a:ext cx="8534400" cy="1752600"/>
           </a:xfrm>
         </p:spPr>
         <p:txBody>
@@ -33382,8 +33360,8 @@
         </p:blipFill>
         <p:spPr bwMode="auto">
           <a:xfrm>
-            <a:off x="457200" y="1727200"/>
-            <a:ext cx="8229600" cy="3759200"/>
+            <a:off x="1701800" y="1600200"/>
+            <a:ext cx="8788400" cy="4013200"/>
           </a:xfrm>
           <a:prstGeom prst="rect">
             <a:avLst/>
@@ -33404,8 +33382,8 @@
         </p:nvSpPr>
         <p:spPr>
           <a:xfrm>
-            <a:off x="457200" y="5613400"/>
-            <a:ext cx="8229600" cy="508000"/>
+            <a:off x="609600" y="5613400"/>
+            <a:ext cx="10972800" cy="508000"/>
           </a:xfrm>
           <a:prstGeom prst="rect">
             <a:avLst/>
@@ -34061,7 +34039,7 @@
         </p:blipFill>
         <p:spPr bwMode="auto">
           <a:xfrm>
-            <a:off x="736600" y="1600200"/>
+            <a:off x="2260600" y="1600200"/>
             <a:ext cx="7683500" cy="4013200"/>
           </a:xfrm>
           <a:prstGeom prst="rect">
@@ -34083,8 +34061,8 @@
         </p:nvSpPr>
         <p:spPr>
           <a:xfrm>
-            <a:off x="457200" y="5613400"/>
-            <a:ext cx="8229600" cy="508000"/>
+            <a:off x="609600" y="5613400"/>
+            <a:ext cx="10972800" cy="508000"/>
           </a:xfrm>
           <a:prstGeom prst="rect">
             <a:avLst/>
@@ -34232,8 +34210,8 @@
         </p:blipFill>
         <p:spPr bwMode="auto">
           <a:xfrm>
-            <a:off x="457200" y="2146300"/>
-            <a:ext cx="8229600" cy="3416300"/>
+            <a:off x="660400" y="1600200"/>
+            <a:ext cx="10883900" cy="4521200"/>
           </a:xfrm>
           <a:prstGeom prst="rect">
             <a:avLst/>
@@ -34349,8 +34327,8 @@
         </p:blipFill>
         <p:spPr bwMode="auto">
           <a:xfrm>
-            <a:off x="457200" y="2146300"/>
-            <a:ext cx="8229600" cy="3416300"/>
+            <a:off x="660400" y="1600200"/>
+            <a:ext cx="10883900" cy="4521200"/>
           </a:xfrm>
           <a:prstGeom prst="rect">
             <a:avLst/>
@@ -35011,7 +34989,7 @@
         </p:blipFill>
         <p:spPr bwMode="auto">
           <a:xfrm>
-            <a:off x="1168400" y="1600200"/>
+            <a:off x="2692400" y="1600200"/>
             <a:ext cx="6807200" cy="4013200"/>
           </a:xfrm>
           <a:prstGeom prst="rect">
@@ -35033,8 +35011,8 @@
         </p:nvSpPr>
         <p:spPr>
           <a:xfrm>
-            <a:off x="457200" y="5613400"/>
-            <a:ext cx="8229600" cy="508000"/>
+            <a:off x="609600" y="5613400"/>
+            <a:ext cx="10972800" cy="508000"/>
           </a:xfrm>
           <a:prstGeom prst="rect">
             <a:avLst/>
@@ -35182,7 +35160,7 @@
         </p:blipFill>
         <p:spPr bwMode="auto">
           <a:xfrm>
-            <a:off x="558800" y="1600200"/>
+            <a:off x="2082800" y="1600200"/>
             <a:ext cx="8026400" cy="4521200"/>
           </a:xfrm>
           <a:prstGeom prst="rect">
@@ -36620,8 +36598,8 @@
         </p:blipFill>
         <p:spPr bwMode="auto">
           <a:xfrm>
-            <a:off x="457200" y="1993900"/>
-            <a:ext cx="8229600" cy="3733800"/>
+            <a:off x="1117600" y="1600200"/>
+            <a:ext cx="9956800" cy="4521200"/>
           </a:xfrm>
           <a:prstGeom prst="rect">
             <a:avLst/>
@@ -37740,6 +37718,11 @@
     </a:lnDef>
   </a:objectDefaults>
   <a:extraClrSchemeLst/>
+  <a:extLst>
+    <a:ext uri="{05A4C25C-085E-4340-85A3-A5531E510DB2}">
+      <thm15:themeFamily xmlns:thm15="http://schemas.microsoft.com/office/thememl/2012/main" name="v04-slides-and-speaker-notes.pptx  -  Read-Only" id="{A55E3E89-A4B4-4BDD-92E9-1742DE988131}" vid="{6280614E-D397-4246-825D-9E3615763BA0}"/>
+    </a:ext>
+  </a:extLst>
 </a:theme>
 </file>
 

</xml_diff>